<commit_message>
Deleted Hero Power, Shockwave is now a card
1) End tile — moved crates
2) Left_Straight tile — removed brick wall and put a crashed plane
instead
3) New card — Shockwave
</commit_message>
<xml_diff>
--- a/Documents/Earth Alone.pptx
+++ b/Documents/Earth Alone.pptx
@@ -255,7 +255,7 @@
           <a:p>
             <a:fld id="{478E4554-8682-0047-81B3-23DF92292DA4}" type="datetimeFigureOut">
               <a:rPr lang="fr-FR" smtClean="0"/>
-              <a:t>17-07-29</a:t>
+              <a:t>17-07-31</a:t>
             </a:fld>
             <a:endParaRPr lang="en-CA"/>
           </a:p>
@@ -421,7 +421,7 @@
           <a:p>
             <a:fld id="{4AA04B09-B6F6-1B43-9949-81D455400551}" type="datetimeFigureOut">
               <a:rPr lang="fr-FR" smtClean="0"/>
-              <a:t>17-07-29</a:t>
+              <a:t>17-07-31</a:t>
             </a:fld>
             <a:endParaRPr lang="en-CA"/>
           </a:p>
@@ -2204,6 +2204,44 @@
           <a:bodyPr/>
           <a:lstStyle/>
           <a:p>
+            <a:r>
+              <a:rPr lang="en-CA" dirty="0" err="1" smtClean="0"/>
+              <a:t>Headhunter</a:t>
+            </a:r>
+            <a:r>
+              <a:rPr lang="en-CA" dirty="0" smtClean="0"/>
+              <a:t> red crosshair on ground, 0.5</a:t>
+            </a:r>
+            <a:r>
+              <a:rPr lang="en-CA" baseline="0" dirty="0" smtClean="0"/>
+              <a:t> sec to counter with cloak or EMP, always targets 1</a:t>
+            </a:r>
+            <a:r>
+              <a:rPr lang="en-CA" baseline="30000" dirty="0" smtClean="0"/>
+              <a:t>st</a:t>
+            </a:r>
+            <a:r>
+              <a:rPr lang="en-CA" baseline="0" dirty="0" smtClean="0"/>
+              <a:t> person, always works.</a:t>
+            </a:r>
+          </a:p>
+          <a:p>
+            <a:r>
+              <a:rPr lang="en-CA" dirty="0" smtClean="0"/>
+              <a:t>Hell storm large scale meteor</a:t>
+            </a:r>
+            <a:r>
+              <a:rPr lang="en-CA" baseline="0" dirty="0" smtClean="0"/>
+              <a:t> strike Legendary 10 second 10 mana</a:t>
+            </a:r>
+          </a:p>
+          <a:p>
+            <a:r>
+              <a:rPr lang="en-CA" baseline="0" dirty="0" smtClean="0"/>
+              <a:t>Tar slows you down</a:t>
+            </a:r>
+          </a:p>
+          <a:p>
             <a:endParaRPr lang="en-CA" dirty="0"/>
           </a:p>
         </p:txBody>
@@ -2596,7 +2634,7 @@
           <a:p>
             <a:fld id="{7839A6EA-F7B1-0B44-BC35-AD132267A4DC}" type="datetime1">
               <a:rPr lang="fr-CA" smtClean="0"/>
-              <a:t>17-07-29</a:t>
+              <a:t>17-07-31</a:t>
             </a:fld>
             <a:endParaRPr lang="en-US" dirty="0"/>
           </a:p>
@@ -2929,7 +2967,7 @@
           <a:p>
             <a:fld id="{BF3955A8-2797-EA4A-9E2A-2F8CFD12BF6E}" type="datetime1">
               <a:rPr lang="fr-CA" smtClean="0"/>
-              <a:t>17-07-29</a:t>
+              <a:t>17-07-31</a:t>
             </a:fld>
             <a:endParaRPr lang="en-CA"/>
           </a:p>
@@ -3355,7 +3393,7 @@
           <a:p>
             <a:fld id="{2623DA68-7C09-344D-94FD-BCCBFF8A9C92}" type="datetime1">
               <a:rPr lang="fr-CA" smtClean="0"/>
-              <a:t>17-07-29</a:t>
+              <a:t>17-07-31</a:t>
             </a:fld>
             <a:endParaRPr lang="en-CA"/>
           </a:p>
@@ -3776,7 +3814,7 @@
           <a:p>
             <a:fld id="{C96802C1-E6A5-A943-B158-E2ED5B1D1748}" type="datetime1">
               <a:rPr lang="fr-CA" smtClean="0"/>
-              <a:t>17-07-29</a:t>
+              <a:t>17-07-31</a:t>
             </a:fld>
             <a:endParaRPr lang="en-CA"/>
           </a:p>
@@ -3913,7 +3951,7 @@
           <a:p>
             <a:fld id="{771726DE-45DE-4B43-ACEE-C75C9862EB06}" type="datetime1">
               <a:rPr lang="fr-CA" smtClean="0"/>
-              <a:t>17-07-29</a:t>
+              <a:t>17-07-31</a:t>
             </a:fld>
             <a:endParaRPr lang="en-CA"/>
           </a:p>
@@ -4239,7 +4277,7 @@
           <a:p>
             <a:fld id="{5658D407-638E-3641-B9A7-D19475F928FE}" type="datetime1">
               <a:rPr lang="fr-CA" smtClean="0"/>
-              <a:t>17-07-29</a:t>
+              <a:t>17-07-31</a:t>
             </a:fld>
             <a:endParaRPr lang="en-CA"/>
           </a:p>
@@ -4487,7 +4525,7 @@
           <a:p>
             <a:fld id="{BB923671-466F-9240-AE09-4C886CE207AA}" type="datetime1">
               <a:rPr lang="fr-CA" smtClean="0"/>
-              <a:t>17-07-29</a:t>
+              <a:t>17-07-31</a:t>
             </a:fld>
             <a:endParaRPr lang="en-CA"/>
           </a:p>
@@ -4829,7 +4867,7 @@
           <a:p>
             <a:fld id="{677FF192-833E-5349-A041-ABA1A9340DDE}" type="datetime1">
               <a:rPr lang="fr-CA" smtClean="0"/>
-              <a:t>17-07-29</a:t>
+              <a:t>17-07-31</a:t>
             </a:fld>
             <a:endParaRPr lang="en-CA"/>
           </a:p>
@@ -5133,7 +5171,7 @@
           <a:p>
             <a:fld id="{09C4B9B5-7EFC-9244-9761-B7BDBB0AA012}" type="datetime1">
               <a:rPr lang="fr-CA" smtClean="0"/>
-              <a:t>17-07-29</a:t>
+              <a:t>17-07-31</a:t>
             </a:fld>
             <a:endParaRPr lang="en-CA"/>
           </a:p>
@@ -5544,7 +5582,7 @@
           <a:p>
             <a:fld id="{F801F428-AE77-E045-9480-3FE3AAF71E65}" type="datetime1">
               <a:rPr lang="fr-CA" smtClean="0"/>
-              <a:t>17-07-29</a:t>
+              <a:t>17-07-31</a:t>
             </a:fld>
             <a:endParaRPr lang="en-CA"/>
           </a:p>
@@ -5770,7 +5808,7 @@
           <a:p>
             <a:fld id="{ADAA07CA-59E0-A243-97BC-43C9F51FD9FF}" type="datetime1">
               <a:rPr lang="fr-CA" smtClean="0"/>
-              <a:t>17-07-29</a:t>
+              <a:t>17-07-31</a:t>
             </a:fld>
             <a:endParaRPr lang="en-CA"/>
           </a:p>
@@ -5991,7 +6029,7 @@
           <a:p>
             <a:fld id="{826A6692-799A-0F4B-A22C-2D282DEB7CD5}" type="datetime1">
               <a:rPr lang="fr-CA" smtClean="0"/>
-              <a:t>17-07-29</a:t>
+              <a:t>17-07-31</a:t>
             </a:fld>
             <a:endParaRPr lang="en-CA"/>
           </a:p>
@@ -6300,7 +6338,7 @@
           <a:p>
             <a:fld id="{DBB7E5EE-521F-EC4A-A5C3-A2A1536DAA8C}" type="datetime1">
               <a:rPr lang="fr-CA" smtClean="0"/>
-              <a:t>17-07-29</a:t>
+              <a:t>17-07-31</a:t>
             </a:fld>
             <a:endParaRPr lang="en-CA"/>
           </a:p>
@@ -6631,7 +6669,7 @@
           <a:p>
             <a:fld id="{3E6BCE1D-B433-BC48-8038-626206E41CB0}" type="datetime1">
               <a:rPr lang="fr-CA" smtClean="0"/>
-              <a:t>17-07-29</a:t>
+              <a:t>17-07-31</a:t>
             </a:fld>
             <a:endParaRPr lang="en-CA"/>
           </a:p>
@@ -6970,7 +7008,7 @@
           <a:p>
             <a:fld id="{4B73CBE7-00BA-814D-A6E3-B3D5A65032CA}" type="datetime1">
               <a:rPr lang="fr-CA" smtClean="0"/>
-              <a:t>17-07-29</a:t>
+              <a:t>17-07-31</a:t>
             </a:fld>
             <a:endParaRPr lang="en-US"/>
           </a:p>
@@ -7597,7 +7635,7 @@
           <a:p>
             <a:fld id="{1DC03657-A2BB-3242-BF25-3D72B79B6372}" type="datetime1">
               <a:rPr lang="fr-CA" smtClean="0"/>
-              <a:t>17-07-29</a:t>
+              <a:t>17-07-31</a:t>
             </a:fld>
             <a:endParaRPr lang="en-CA"/>
           </a:p>
@@ -8088,7 +8126,7 @@
           <a:p>
             <a:fld id="{A36AC3A7-7839-B545-A9B3-950A645AC025}" type="datetime1">
               <a:rPr lang="fr-CA" smtClean="0"/>
-              <a:t>17-07-29</a:t>
+              <a:t>17-07-31</a:t>
             </a:fld>
             <a:endParaRPr lang="en-CA"/>
           </a:p>
@@ -8340,7 +8378,7 @@
           <a:p>
             <a:fld id="{FB43067C-42C1-1C43-B902-066143DC70F1}" type="datetime1">
               <a:rPr lang="fr-CA" smtClean="0"/>
-              <a:t>17-07-29</a:t>
+              <a:t>17-07-31</a:t>
             </a:fld>
             <a:endParaRPr lang="en-CA"/>
           </a:p>
@@ -8640,7 +8678,7 @@
           <a:p>
             <a:fld id="{E0F2C6FF-FE77-EB42-A8D7-C92EEE9F8CA5}" type="datetime1">
               <a:rPr lang="fr-CA" smtClean="0"/>
-              <a:t>17-07-29</a:t>
+              <a:t>17-07-31</a:t>
             </a:fld>
             <a:endParaRPr lang="en-CA"/>
           </a:p>
@@ -15513,14 +15551,14 @@
             <p:ph idx="1"/>
             <p:extLst>
               <p:ext uri="{D42A27DB-BD31-4B8C-83A1-F6EECF244321}">
-                <p14:modId xmlns:p14="http://schemas.microsoft.com/office/powerpoint/2010/main" val="1760374599"/>
+                <p14:modId xmlns:p14="http://schemas.microsoft.com/office/powerpoint/2010/main" val="973709541"/>
               </p:ext>
             </p:extLst>
           </p:nvPr>
         </p:nvGraphicFramePr>
         <p:xfrm>
           <a:off x="774700" y="2197100"/>
-          <a:ext cx="7637772" cy="3606800"/>
+          <a:ext cx="7637772" cy="3337560"/>
         </p:xfrm>
         <a:graphic>
           <a:graphicData uri="http://schemas.openxmlformats.org/drawingml/2006/table">
@@ -16174,8 +16212,8 @@
                     <a:lstStyle/>
                     <a:p>
                       <a:r>
-                        <a:rPr lang="en-CA" dirty="0" smtClean="0"/>
-                        <a:t>Seek &amp; destroy</a:t>
+                        <a:rPr lang="en-CA" dirty="0" err="1" smtClean="0"/>
+                        <a:t>Headhunter</a:t>
                       </a:r>
                       <a:endParaRPr lang="en-CA" dirty="0"/>
                     </a:p>

</xml_diff>

<commit_message>
Improved way to check if a card is active and more
1) Stasis has a duration timer
2) Renamed cancelSpeedBoost to cancelRagingBull
3) Deleted input cheats to activate jet pack
4) Updated deck regarding Hero Power
5) Reflect is now canceled when you die or complete the race
</commit_message>
<xml_diff>
--- a/Documents/Earth Alone.pptx
+++ b/Documents/Earth Alone.pptx
@@ -255,7 +255,7 @@
           <a:p>
             <a:fld id="{478E4554-8682-0047-81B3-23DF92292DA4}" type="datetimeFigureOut">
               <a:rPr lang="fr-FR" smtClean="0"/>
-              <a:t>17-07-31</a:t>
+              <a:t>17-08-01</a:t>
             </a:fld>
             <a:endParaRPr lang="en-CA"/>
           </a:p>
@@ -421,7 +421,7 @@
           <a:p>
             <a:fld id="{4AA04B09-B6F6-1B43-9949-81D455400551}" type="datetimeFigureOut">
               <a:rPr lang="fr-FR" smtClean="0"/>
-              <a:t>17-07-31</a:t>
+              <a:t>17-08-01</a:t>
             </a:fld>
             <a:endParaRPr lang="en-CA"/>
           </a:p>
@@ -2634,7 +2634,7 @@
           <a:p>
             <a:fld id="{7839A6EA-F7B1-0B44-BC35-AD132267A4DC}" type="datetime1">
               <a:rPr lang="fr-CA" smtClean="0"/>
-              <a:t>17-07-31</a:t>
+              <a:t>17-08-01</a:t>
             </a:fld>
             <a:endParaRPr lang="en-US" dirty="0"/>
           </a:p>
@@ -2967,7 +2967,7 @@
           <a:p>
             <a:fld id="{BF3955A8-2797-EA4A-9E2A-2F8CFD12BF6E}" type="datetime1">
               <a:rPr lang="fr-CA" smtClean="0"/>
-              <a:t>17-07-31</a:t>
+              <a:t>17-08-01</a:t>
             </a:fld>
             <a:endParaRPr lang="en-CA"/>
           </a:p>
@@ -3393,7 +3393,7 @@
           <a:p>
             <a:fld id="{2623DA68-7C09-344D-94FD-BCCBFF8A9C92}" type="datetime1">
               <a:rPr lang="fr-CA" smtClean="0"/>
-              <a:t>17-07-31</a:t>
+              <a:t>17-08-01</a:t>
             </a:fld>
             <a:endParaRPr lang="en-CA"/>
           </a:p>
@@ -3814,7 +3814,7 @@
           <a:p>
             <a:fld id="{C96802C1-E6A5-A943-B158-E2ED5B1D1748}" type="datetime1">
               <a:rPr lang="fr-CA" smtClean="0"/>
-              <a:t>17-07-31</a:t>
+              <a:t>17-08-01</a:t>
             </a:fld>
             <a:endParaRPr lang="en-CA"/>
           </a:p>
@@ -3951,7 +3951,7 @@
           <a:p>
             <a:fld id="{771726DE-45DE-4B43-ACEE-C75C9862EB06}" type="datetime1">
               <a:rPr lang="fr-CA" smtClean="0"/>
-              <a:t>17-07-31</a:t>
+              <a:t>17-08-01</a:t>
             </a:fld>
             <a:endParaRPr lang="en-CA"/>
           </a:p>
@@ -4277,7 +4277,7 @@
           <a:p>
             <a:fld id="{5658D407-638E-3641-B9A7-D19475F928FE}" type="datetime1">
               <a:rPr lang="fr-CA" smtClean="0"/>
-              <a:t>17-07-31</a:t>
+              <a:t>17-08-01</a:t>
             </a:fld>
             <a:endParaRPr lang="en-CA"/>
           </a:p>
@@ -4525,7 +4525,7 @@
           <a:p>
             <a:fld id="{BB923671-466F-9240-AE09-4C886CE207AA}" type="datetime1">
               <a:rPr lang="fr-CA" smtClean="0"/>
-              <a:t>17-07-31</a:t>
+              <a:t>17-08-01</a:t>
             </a:fld>
             <a:endParaRPr lang="en-CA"/>
           </a:p>
@@ -4867,7 +4867,7 @@
           <a:p>
             <a:fld id="{677FF192-833E-5349-A041-ABA1A9340DDE}" type="datetime1">
               <a:rPr lang="fr-CA" smtClean="0"/>
-              <a:t>17-07-31</a:t>
+              <a:t>17-08-01</a:t>
             </a:fld>
             <a:endParaRPr lang="en-CA"/>
           </a:p>
@@ -5171,7 +5171,7 @@
           <a:p>
             <a:fld id="{09C4B9B5-7EFC-9244-9761-B7BDBB0AA012}" type="datetime1">
               <a:rPr lang="fr-CA" smtClean="0"/>
-              <a:t>17-07-31</a:t>
+              <a:t>17-08-01</a:t>
             </a:fld>
             <a:endParaRPr lang="en-CA"/>
           </a:p>
@@ -5582,7 +5582,7 @@
           <a:p>
             <a:fld id="{F801F428-AE77-E045-9480-3FE3AAF71E65}" type="datetime1">
               <a:rPr lang="fr-CA" smtClean="0"/>
-              <a:t>17-07-31</a:t>
+              <a:t>17-08-01</a:t>
             </a:fld>
             <a:endParaRPr lang="en-CA"/>
           </a:p>
@@ -5808,7 +5808,7 @@
           <a:p>
             <a:fld id="{ADAA07CA-59E0-A243-97BC-43C9F51FD9FF}" type="datetime1">
               <a:rPr lang="fr-CA" smtClean="0"/>
-              <a:t>17-07-31</a:t>
+              <a:t>17-08-01</a:t>
             </a:fld>
             <a:endParaRPr lang="en-CA"/>
           </a:p>
@@ -6029,7 +6029,7 @@
           <a:p>
             <a:fld id="{826A6692-799A-0F4B-A22C-2D282DEB7CD5}" type="datetime1">
               <a:rPr lang="fr-CA" smtClean="0"/>
-              <a:t>17-07-31</a:t>
+              <a:t>17-08-01</a:t>
             </a:fld>
             <a:endParaRPr lang="en-CA"/>
           </a:p>
@@ -6338,7 +6338,7 @@
           <a:p>
             <a:fld id="{DBB7E5EE-521F-EC4A-A5C3-A2A1536DAA8C}" type="datetime1">
               <a:rPr lang="fr-CA" smtClean="0"/>
-              <a:t>17-07-31</a:t>
+              <a:t>17-08-01</a:t>
             </a:fld>
             <a:endParaRPr lang="en-CA"/>
           </a:p>
@@ -6669,7 +6669,7 @@
           <a:p>
             <a:fld id="{3E6BCE1D-B433-BC48-8038-626206E41CB0}" type="datetime1">
               <a:rPr lang="fr-CA" smtClean="0"/>
-              <a:t>17-07-31</a:t>
+              <a:t>17-08-01</a:t>
             </a:fld>
             <a:endParaRPr lang="en-CA"/>
           </a:p>
@@ -7008,7 +7008,7 @@
           <a:p>
             <a:fld id="{4B73CBE7-00BA-814D-A6E3-B3D5A65032CA}" type="datetime1">
               <a:rPr lang="fr-CA" smtClean="0"/>
-              <a:t>17-07-31</a:t>
+              <a:t>17-08-01</a:t>
             </a:fld>
             <a:endParaRPr lang="en-US"/>
           </a:p>
@@ -7635,7 +7635,7 @@
           <a:p>
             <a:fld id="{1DC03657-A2BB-3242-BF25-3D72B79B6372}" type="datetime1">
               <a:rPr lang="fr-CA" smtClean="0"/>
-              <a:t>17-07-31</a:t>
+              <a:t>17-08-01</a:t>
             </a:fld>
             <a:endParaRPr lang="en-CA"/>
           </a:p>
@@ -8126,7 +8126,7 @@
           <a:p>
             <a:fld id="{A36AC3A7-7839-B545-A9B3-950A645AC025}" type="datetime1">
               <a:rPr lang="fr-CA" smtClean="0"/>
-              <a:t>17-07-31</a:t>
+              <a:t>17-08-01</a:t>
             </a:fld>
             <a:endParaRPr lang="en-CA"/>
           </a:p>
@@ -8378,7 +8378,7 @@
           <a:p>
             <a:fld id="{FB43067C-42C1-1C43-B902-066143DC70F1}" type="datetime1">
               <a:rPr lang="fr-CA" smtClean="0"/>
-              <a:t>17-07-31</a:t>
+              <a:t>17-08-01</a:t>
             </a:fld>
             <a:endParaRPr lang="en-CA"/>
           </a:p>
@@ -8678,7 +8678,7 @@
           <a:p>
             <a:fld id="{E0F2C6FF-FE77-EB42-A8D7-C92EEE9F8CA5}" type="datetime1">
               <a:rPr lang="fr-CA" smtClean="0"/>
-              <a:t>17-07-31</a:t>
+              <a:t>17-08-01</a:t>
             </a:fld>
             <a:endParaRPr lang="en-CA"/>
           </a:p>
@@ -9899,7 +9899,7 @@
           <a:p>
             <a:r>
               <a:rPr lang="en-CA" dirty="0" smtClean="0"/>
-              <a:t>Heroes – Unique Power</a:t>
+              <a:t>Heroes – Unique Card</a:t>
             </a:r>
             <a:endParaRPr lang="en-CA" dirty="0"/>
           </a:p>
@@ -9918,15 +9918,31 @@
         <p:spPr/>
         <p:txBody>
           <a:bodyPr>
-            <a:normAutofit/>
+            <a:normAutofit lnSpcReduction="10000"/>
           </a:bodyPr>
           <a:lstStyle/>
           <a:p>
             <a:r>
               <a:rPr lang="en-CA" dirty="0" smtClean="0"/>
-              <a:t>Each hero has a unique power which reflects their personality</a:t>
-            </a:r>
-            <a:endParaRPr lang="en-CA" b="1" dirty="0" smtClean="0"/>
+              <a:t>Each hero has a unique card which reflects their personality</a:t>
+            </a:r>
+          </a:p>
+          <a:p>
+            <a:r>
+              <a:rPr lang="en-CA" dirty="0" smtClean="0"/>
+              <a:t>The card associated to your currently selected hero is always in your player </a:t>
+            </a:r>
+            <a:r>
+              <a:rPr lang="en-CA" dirty="0" smtClean="0"/>
+              <a:t>deck</a:t>
+            </a:r>
+          </a:p>
+          <a:p>
+            <a:r>
+              <a:rPr lang="en-CA" dirty="0" smtClean="0"/>
+              <a:t>You can only use the card if you play with the associated hero</a:t>
+            </a:r>
+            <a:endParaRPr lang="en-CA" dirty="0" smtClean="0"/>
           </a:p>
           <a:p>
             <a:r>
@@ -9957,34 +9973,19 @@
               <a:rPr lang="en-CA" dirty="0" smtClean="0"/>
               <a:t>, etc.</a:t>
             </a:r>
-          </a:p>
-          <a:p>
-            <a:r>
-              <a:rPr lang="en-CA" dirty="0" smtClean="0"/>
-              <a:t>Each unique power has cool-down period of 30 seconds or so</a:t>
-            </a:r>
-          </a:p>
-          <a:p>
-            <a:r>
-              <a:rPr lang="en-CA" dirty="0"/>
-              <a:t>Powers cannot be </a:t>
-            </a:r>
-            <a:r>
-              <a:rPr lang="en-CA" dirty="0" smtClean="0"/>
-              <a:t>upgraded</a:t>
-            </a:r>
-          </a:p>
-          <a:p>
-            <a:r>
-              <a:rPr lang="en-CA" dirty="0" smtClean="0"/>
-              <a:t>Tap on the power icon below the turn-ribbon to activate the power</a:t>
-            </a:r>
-          </a:p>
-          <a:p>
-            <a:pPr marL="0" indent="0">
-              <a:buNone/>
-            </a:pPr>
             <a:endParaRPr lang="en-CA" dirty="0"/>
+          </a:p>
+          <a:p>
+            <a:r>
+              <a:rPr lang="en-CA" dirty="0" smtClean="0"/>
+              <a:t>The card can be upgraded normally just like any other card</a:t>
+            </a:r>
+          </a:p>
+          <a:p>
+            <a:endParaRPr lang="en-CA" dirty="0"/>
+          </a:p>
+          <a:p>
+            <a:endParaRPr lang="en-CA" dirty="0" smtClean="0"/>
           </a:p>
         </p:txBody>
       </p:sp>

</xml_diff>

<commit_message>
Earth Alone v1.4 - changed some terms
</commit_message>
<xml_diff>
--- a/Documents/Earth Alone.pptx
+++ b/Documents/Earth Alone.pptx
@@ -9396,7 +9396,7 @@
                   <a:schemeClr val="bg2"/>
                 </a:solidFill>
               </a:rPr>
-              <a:t>V1.3</a:t>
+              <a:t>V1.4</a:t>
             </a:r>
             <a:endParaRPr lang="en-CA" sz="1200" i="1" dirty="0">
               <a:solidFill>
@@ -9591,11 +9591,7 @@
             </a:r>
             <a:r>
               <a:rPr lang="en-CA" dirty="0" smtClean="0"/>
-              <a:t>It’s </a:t>
-            </a:r>
-            <a:r>
-              <a:rPr lang="en-CA" dirty="0" smtClean="0"/>
-              <a:t>full of humour </a:t>
+              <a:t>It’s full of humour </a:t>
             </a:r>
             <a:r>
               <a:rPr lang="en-CA" dirty="0"/>
@@ -9895,11 +9891,7 @@
           <a:p>
             <a:r>
               <a:rPr lang="en-CA" dirty="0" smtClean="0"/>
-              <a:t>You </a:t>
-            </a:r>
-            <a:r>
-              <a:rPr lang="en-CA" dirty="0" smtClean="0"/>
-              <a:t>lose clan members if you lose too many missions in a row</a:t>
+              <a:t>You lose clan members if you lose too many missions in a row</a:t>
             </a:r>
           </a:p>
           <a:p>
@@ -10021,16 +10013,21 @@
           <a:p>
             <a:r>
               <a:rPr lang="en-CA" dirty="0" smtClean="0"/>
-              <a:t>Every </a:t>
-            </a:r>
-            <a:r>
-              <a:rPr lang="en-CA" dirty="0" smtClean="0"/>
-              <a:t>time you increase significantly your clan membership, your hangout looks </a:t>
+              <a:t>Every time you increase significantly your clan </a:t>
+            </a:r>
+            <a:r>
+              <a:rPr lang="en-CA" dirty="0" smtClean="0"/>
+              <a:t>membership*, </a:t>
+            </a:r>
+            <a:r>
+              <a:rPr lang="en-CA" dirty="0" smtClean="0"/>
+              <a:t>your hangout looks </a:t>
             </a:r>
             <a:r>
               <a:rPr lang="en-CA" dirty="0" smtClean="0"/>
               <a:t>nicer</a:t>
             </a:r>
+            <a:endParaRPr lang="en-CA" dirty="0" smtClean="0"/>
           </a:p>
           <a:p>
             <a:pPr lvl="1"/>
@@ -10072,12 +10069,11 @@
               <a:rPr lang="en-CA" dirty="0" smtClean="0"/>
               <a:t>menu</a:t>
             </a:r>
+          </a:p>
+          <a:p>
             <a:endParaRPr lang="en-CA" dirty="0" smtClean="0"/>
           </a:p>
           <a:p>
-            <a:endParaRPr lang="en-CA" dirty="0" smtClean="0"/>
-          </a:p>
-          <a:p>
             <a:endParaRPr lang="en-CA" dirty="0"/>
           </a:p>
         </p:txBody>
@@ -10098,10 +10094,56 @@
           <a:lstStyle/>
           <a:p>
             <a:r>
-              <a:rPr lang="en-CA" smtClean="0"/>
+              <a:rPr lang="en-CA" dirty="0" smtClean="0"/>
               <a:t>Copyright 2017 Regis Geoffrion</a:t>
             </a:r>
-            <a:endParaRPr lang="en-CA"/>
+            <a:endParaRPr lang="en-CA" dirty="0"/>
+          </a:p>
+        </p:txBody>
+      </p:sp>
+      <p:sp>
+        <p:nvSpPr>
+          <p:cNvPr id="2" name="ZoneTexte 1"/>
+          <p:cNvSpPr txBox="1"/>
+          <p:nvPr/>
+        </p:nvSpPr>
+        <p:spPr>
+          <a:xfrm>
+            <a:off x="450850" y="6033171"/>
+            <a:ext cx="5015240" cy="276999"/>
+          </a:xfrm>
+          <a:prstGeom prst="rect">
+            <a:avLst/>
+          </a:prstGeom>
+          <a:noFill/>
+        </p:spPr>
+        <p:txBody>
+          <a:bodyPr wrap="none" rtlCol="0">
+            <a:spAutoFit/>
+          </a:bodyPr>
+          <a:lstStyle/>
+          <a:p>
+            <a:r>
+              <a:rPr lang="en-CA" sz="1200" i="1" dirty="0" smtClean="0"/>
+              <a:t>* # of </a:t>
+            </a:r>
+            <a:r>
+              <a:rPr lang="en-CA" sz="1200" i="1" dirty="0"/>
+              <a:t>clan members is similar to the </a:t>
+            </a:r>
+            <a:r>
+              <a:rPr lang="en-CA" sz="1200" i="1" dirty="0" smtClean="0"/>
+              <a:t># of </a:t>
+            </a:r>
+            <a:r>
+              <a:rPr lang="en-CA" sz="1200" i="1" dirty="0"/>
+              <a:t>trophies in Clash </a:t>
+            </a:r>
+            <a:r>
+              <a:rPr lang="en-CA" sz="1200" i="1" dirty="0" smtClean="0"/>
+              <a:t>Royale.</a:t>
+            </a:r>
+            <a:endParaRPr lang="en-CA" sz="1200" i="1" dirty="0"/>
           </a:p>
         </p:txBody>
       </p:sp>
@@ -10206,15 +10248,7 @@
           <a:p>
             <a:r>
               <a:rPr lang="en-CA" dirty="0" smtClean="0"/>
-              <a:t>Each </a:t>
-            </a:r>
-            <a:r>
-              <a:rPr lang="en-CA" dirty="0" smtClean="0"/>
-              <a:t>hangout upgrade unlocks </a:t>
-            </a:r>
-            <a:r>
-              <a:rPr lang="en-CA" dirty="0" smtClean="0"/>
-              <a:t>3 new cards</a:t>
+              <a:t>Each hangout upgrade unlocks 3 new cards</a:t>
             </a:r>
           </a:p>
           <a:p>
@@ -10222,7 +10256,6 @@
               <a:rPr lang="en-CA" dirty="0" smtClean="0"/>
               <a:t>At launch, there will be 4 hangout levels. More will be added post-launch</a:t>
             </a:r>
-            <a:endParaRPr lang="en-CA" dirty="0" smtClean="0"/>
           </a:p>
         </p:txBody>
       </p:sp>
@@ -10536,7 +10569,11 @@
           <a:p>
             <a:r>
               <a:rPr lang="en-CA" dirty="0" smtClean="0"/>
-              <a:t>Heroes – Unique Card</a:t>
+              <a:t>Heroes – Unique </a:t>
+            </a:r>
+            <a:r>
+              <a:rPr lang="en-CA" dirty="0" smtClean="0"/>
+              <a:t>Ability</a:t>
             </a:r>
             <a:endParaRPr lang="en-CA" dirty="0"/>
           </a:p>
@@ -10727,21 +10764,13 @@
           <a:p>
             <a:r>
               <a:rPr lang="en-CA" dirty="0" smtClean="0"/>
-              <a:t>There are initially 6 heroes to chose from. More will be added in </a:t>
-            </a:r>
-            <a:r>
-              <a:rPr lang="en-CA" dirty="0" smtClean="0"/>
-              <a:t>updates</a:t>
-            </a:r>
-          </a:p>
-          <a:p>
-            <a:r>
-              <a:rPr lang="en-CA" dirty="0" smtClean="0"/>
-              <a:t>Heroes </a:t>
-            </a:r>
-            <a:r>
-              <a:rPr lang="en-CA" dirty="0" smtClean="0"/>
-              <a:t>are balanced so that none of them are overpowered</a:t>
+              <a:t>There are initially 6 heroes to chose from. More will be added in updates</a:t>
+            </a:r>
+          </a:p>
+          <a:p>
+            <a:r>
+              <a:rPr lang="en-CA" dirty="0" smtClean="0"/>
+              <a:t>Heroes are balanced so that none of them are overpowered</a:t>
             </a:r>
           </a:p>
           <a:p>
@@ -10860,46 +10889,14 @@
           <a:p>
             <a:r>
               <a:rPr lang="en-CA" dirty="0" smtClean="0"/>
-              <a:t>In 2086, the evacuation of the Earth was </a:t>
-            </a:r>
-            <a:r>
-              <a:rPr lang="en-CA" dirty="0" smtClean="0"/>
-              <a:t>completed, </a:t>
-            </a:r>
-            <a:r>
-              <a:rPr lang="en-CA" dirty="0" smtClean="0"/>
-              <a:t>and the last spaceship carrying </a:t>
-            </a:r>
-            <a:r>
-              <a:rPr lang="en-CA" dirty="0" smtClean="0"/>
-              <a:t>Earth’s </a:t>
-            </a:r>
-            <a:r>
-              <a:rPr lang="en-CA" dirty="0" smtClean="0"/>
-              <a:t>inhabitants left for Kepler 780, its destination, and </a:t>
-            </a:r>
-            <a:r>
-              <a:rPr lang="en-CA" dirty="0" smtClean="0"/>
-              <a:t>new </a:t>
-            </a:r>
-            <a:r>
-              <a:rPr lang="en-CA" dirty="0" smtClean="0"/>
-              <a:t>home</a:t>
+              <a:t>In 2086, the evacuation of the Earth was completed, and the last spaceship carrying Earth’s inhabitants left for Kepler 780, its destination, and new home</a:t>
             </a:r>
             <a:endParaRPr lang="en-CA" dirty="0"/>
           </a:p>
           <a:p>
             <a:r>
               <a:rPr lang="en-CA" dirty="0" smtClean="0"/>
-              <a:t>The meteor that was to strike the Earth was partially deflected at the eleventh hour by a salvo of nuclear missiles, and in the end only a chunk of the meteor hit the </a:t>
-            </a:r>
-            <a:r>
-              <a:rPr lang="en-CA" dirty="0" smtClean="0"/>
-              <a:t>Earth</a:t>
-            </a:r>
-            <a:r>
-              <a:rPr lang="en-CA" dirty="0" smtClean="0"/>
-              <a:t>, avoiding its obliteration</a:t>
+              <a:t>The meteor that was to strike the Earth was partially deflected at the eleventh hour by a salvo of nuclear missiles, and in the end only a chunk of the meteor hit the Earth, avoiding its obliteration</a:t>
             </a:r>
           </a:p>
           <a:p>
@@ -12316,7 +12313,7 @@
           <a:p>
             <a:r>
               <a:rPr lang="en-CA" dirty="0" smtClean="0"/>
-              <a:t>Hero Powers</a:t>
+              <a:t>Unique Abilities</a:t>
             </a:r>
             <a:endParaRPr lang="en-CA" dirty="0"/>
           </a:p>
@@ -13856,31 +13853,14 @@
           <a:p>
             <a:r>
               <a:rPr lang="en-CA" dirty="0" smtClean="0"/>
-              <a:t>26 </a:t>
-            </a:r>
-            <a:r>
-              <a:rPr lang="en-CA" dirty="0" smtClean="0"/>
-              <a:t>cards will be available at launch. More will be added later</a:t>
-            </a:r>
-          </a:p>
-          <a:p>
-            <a:r>
-              <a:rPr lang="en-CA" dirty="0" smtClean="0"/>
-              <a:t>6 </a:t>
-            </a:r>
-            <a:r>
-              <a:rPr lang="en-CA" dirty="0" smtClean="0"/>
-              <a:t>of </a:t>
-            </a:r>
-            <a:r>
-              <a:rPr lang="en-CA" dirty="0" smtClean="0"/>
-              <a:t>these are Hero </a:t>
-            </a:r>
-            <a:r>
-              <a:rPr lang="en-CA" dirty="0" smtClean="0"/>
-              <a:t>cards</a:t>
-            </a:r>
-            <a:endParaRPr lang="en-CA" dirty="0" smtClean="0"/>
+              <a:t>26 cards will be available at launch. More will be added later</a:t>
+            </a:r>
+          </a:p>
+          <a:p>
+            <a:r>
+              <a:rPr lang="en-CA" dirty="0" smtClean="0"/>
+              <a:t>6 of these are Hero cards</a:t>
+            </a:r>
           </a:p>
           <a:p>
             <a:r>
@@ -13891,11 +13871,7 @@
           <a:p>
             <a:r>
               <a:rPr lang="en-CA" dirty="0" smtClean="0"/>
-              <a:t>3 </a:t>
-            </a:r>
-            <a:r>
-              <a:rPr lang="en-CA" dirty="0" smtClean="0"/>
-              <a:t>cards get unlocked every time the player hits a milestone in terms of clan size</a:t>
+              <a:t>3 cards get unlocked every time the player hits a milestone in terms of clan size</a:t>
             </a:r>
           </a:p>
         </p:txBody>
@@ -18179,11 +18155,7 @@
             <a:pPr lvl="1"/>
             <a:r>
               <a:rPr lang="en-CA" dirty="0" smtClean="0"/>
-              <a:t>Increase your clan </a:t>
-            </a:r>
-            <a:r>
-              <a:rPr lang="en-CA" dirty="0" smtClean="0"/>
-              <a:t>size</a:t>
+              <a:t>Increase your clan size</a:t>
             </a:r>
           </a:p>
           <a:p>
@@ -18218,11 +18190,7 @@
             <a:pPr lvl="1"/>
             <a:r>
               <a:rPr lang="en-CA" dirty="0" smtClean="0"/>
-              <a:t>There are 6 ranks in </a:t>
-            </a:r>
-            <a:r>
-              <a:rPr lang="en-CA" dirty="0" smtClean="0"/>
-              <a:t>all</a:t>
+              <a:t>There are 6 ranks in all</a:t>
             </a:r>
           </a:p>
           <a:p>
@@ -18449,39 +18417,21 @@
             <a:pPr lvl="1"/>
             <a:r>
               <a:rPr lang="en-CA" dirty="0" smtClean="0"/>
-              <a:t>Quick </a:t>
-            </a:r>
-            <a:r>
-              <a:rPr lang="en-CA" dirty="0" smtClean="0"/>
-              <a:t>Play (non-competitive)</a:t>
-            </a:r>
-            <a:endParaRPr lang="en-CA" dirty="0" smtClean="0"/>
+              <a:t>Quick Play (non-competitive)</a:t>
+            </a:r>
           </a:p>
           <a:p>
             <a:pPr lvl="2"/>
             <a:r>
               <a:rPr lang="en-CA" dirty="0" smtClean="0"/>
-              <a:t>Matches </a:t>
-            </a:r>
-            <a:r>
-              <a:rPr lang="en-CA" dirty="0" smtClean="0"/>
-              <a:t>you against 1, 2 or 3 players </a:t>
-            </a:r>
-            <a:r>
-              <a:rPr lang="en-CA" dirty="0" smtClean="0"/>
-              <a:t>with the same hangout level</a:t>
-            </a:r>
-            <a:endParaRPr lang="en-CA" dirty="0" smtClean="0"/>
+              <a:t>Matches you against 1, 2 or 3 players with the same hangout level</a:t>
+            </a:r>
           </a:p>
           <a:p>
             <a:pPr lvl="2"/>
             <a:r>
               <a:rPr lang="en-CA" dirty="0" smtClean="0"/>
-              <a:t>Missions with more players allow you to earn more </a:t>
-            </a:r>
-            <a:r>
-              <a:rPr lang="en-CA" dirty="0" smtClean="0"/>
-              <a:t>coins</a:t>
+              <a:t>Missions with more players allow you to earn more coins</a:t>
             </a:r>
           </a:p>
           <a:p>
@@ -18490,7 +18440,6 @@
               <a:rPr lang="en-CA" dirty="0" smtClean="0"/>
               <a:t>Location is random</a:t>
             </a:r>
-            <a:endParaRPr lang="en-CA" dirty="0" smtClean="0"/>
           </a:p>
           <a:p>
             <a:pPr lvl="1"/>
@@ -18525,24 +18474,15 @@
             <a:pPr lvl="1"/>
             <a:r>
               <a:rPr lang="en-CA" dirty="0" smtClean="0"/>
-              <a:t>Play </a:t>
-            </a:r>
-            <a:r>
-              <a:rPr lang="en-CA" dirty="0" smtClean="0"/>
-              <a:t>with friend</a:t>
+              <a:t>Play with friend</a:t>
             </a:r>
           </a:p>
           <a:p>
             <a:pPr lvl="2"/>
             <a:r>
               <a:rPr lang="en-CA" dirty="0" smtClean="0"/>
-              <a:t>Allows you to play with one friend. You need to know the friend’s user name to invite him or </a:t>
-            </a:r>
-            <a:r>
-              <a:rPr lang="en-CA" dirty="0" smtClean="0"/>
-              <a:t>her. The person inviting decides on the location</a:t>
-            </a:r>
-            <a:endParaRPr lang="en-CA" dirty="0" smtClean="0"/>
+              <a:t>Allows you to play with one friend. You need to know the friend’s user name to invite him or her. The person inviting decides on the location</a:t>
+            </a:r>
           </a:p>
         </p:txBody>
       </p:sp>
@@ -19360,7 +19300,15 @@
             <a:pPr lvl="1"/>
             <a:r>
               <a:rPr lang="en-CA" dirty="0" smtClean="0"/>
-              <a:t>When you have earned 10 crowns through racing</a:t>
+              <a:t>When you have earned </a:t>
+            </a:r>
+            <a:r>
+              <a:rPr lang="en-CA" dirty="0" smtClean="0"/>
+              <a:t>100 supplies through </a:t>
+            </a:r>
+            <a:r>
+              <a:rPr lang="en-CA" dirty="0" smtClean="0"/>
+              <a:t>racing</a:t>
             </a:r>
           </a:p>
           <a:p>
@@ -19473,14 +19421,23 @@
           <a:p>
             <a:r>
               <a:rPr lang="en-CA" dirty="0" smtClean="0"/>
-              <a:t>Coins</a:t>
-            </a:r>
-          </a:p>
-          <a:p>
-            <a:r>
-              <a:rPr lang="en-CA" dirty="0" smtClean="0"/>
-              <a:t>Gems (not all loot boxes gives gems)</a:t>
-            </a:r>
+              <a:t>Credits</a:t>
+            </a:r>
+          </a:p>
+          <a:p>
+            <a:r>
+              <a:rPr lang="en-CA" dirty="0" smtClean="0"/>
+              <a:t>Titanium (not </a:t>
+            </a:r>
+            <a:r>
+              <a:rPr lang="en-CA" dirty="0" smtClean="0"/>
+              <a:t>all loot boxes gives </a:t>
+            </a:r>
+            <a:r>
+              <a:rPr lang="en-CA" dirty="0" smtClean="0"/>
+              <a:t>Titanium)</a:t>
+            </a:r>
+            <a:endParaRPr lang="en-CA" dirty="0" smtClean="0"/>
           </a:p>
           <a:p>
             <a:r>
@@ -19621,29 +19578,41 @@
             <a:pPr lvl="1"/>
             <a:r>
               <a:rPr lang="en-CA" sz="2400" dirty="0" smtClean="0"/>
-              <a:t>Gems using $</a:t>
-            </a:r>
+              <a:t>Titanium using $ (hard currency)</a:t>
+            </a:r>
+            <a:endParaRPr lang="en-CA" sz="2400" dirty="0" smtClean="0"/>
           </a:p>
           <a:p>
             <a:pPr lvl="1"/>
             <a:r>
               <a:rPr lang="en-CA" sz="2400" dirty="0" smtClean="0"/>
-              <a:t>Coins using gems</a:t>
-            </a:r>
+              <a:t>Credits using titanium (soft currency)</a:t>
+            </a:r>
+            <a:endParaRPr lang="en-CA" sz="2400" dirty="0" smtClean="0"/>
           </a:p>
           <a:p>
             <a:pPr lvl="1"/>
             <a:r>
               <a:rPr lang="en-CA" sz="2400" dirty="0"/>
-              <a:t>Loot boxes using gems</a:t>
-            </a:r>
+              <a:t>Loot boxes using </a:t>
+            </a:r>
+            <a:r>
+              <a:rPr lang="en-CA" sz="2400" dirty="0"/>
+              <a:t>titanium</a:t>
+            </a:r>
+            <a:endParaRPr lang="en-CA" sz="2400" dirty="0"/>
           </a:p>
           <a:p>
             <a:pPr lvl="1"/>
             <a:r>
               <a:rPr lang="en-CA" sz="2400" dirty="0" smtClean="0"/>
-              <a:t>Cards using coins</a:t>
-            </a:r>
+              <a:t>Cards using </a:t>
+            </a:r>
+            <a:r>
+              <a:rPr lang="en-CA" sz="2400" dirty="0" smtClean="0"/>
+              <a:t>credits</a:t>
+            </a:r>
+            <a:endParaRPr lang="en-CA" sz="2400" dirty="0" smtClean="0"/>
           </a:p>
         </p:txBody>
       </p:sp>
@@ -20624,11 +20593,7 @@
             </a:r>
             <a:r>
               <a:rPr lang="en-CA" dirty="0" smtClean="0"/>
-              <a:t>yperloop </a:t>
-            </a:r>
-            <a:r>
-              <a:rPr lang="en-CA" dirty="0" smtClean="0"/>
-              <a:t>train track</a:t>
+              <a:t>yperloop train track</a:t>
             </a:r>
             <a:endParaRPr lang="en-CA" dirty="0"/>
           </a:p>

</xml_diff>

<commit_message>
Earth Alone - v1.5 tweaks on what you earn in offline
</commit_message>
<xml_diff>
--- a/Documents/Earth Alone.pptx
+++ b/Documents/Earth Alone.pptx
@@ -9396,7 +9396,7 @@
                   <a:schemeClr val="bg2"/>
                 </a:solidFill>
               </a:rPr>
-              <a:t>V1.4</a:t>
+              <a:t>V1.5</a:t>
             </a:r>
             <a:endParaRPr lang="en-CA" sz="1200" i="1" dirty="0">
               <a:solidFill>
@@ -10013,21 +10013,8 @@
           <a:p>
             <a:r>
               <a:rPr lang="en-CA" dirty="0" smtClean="0"/>
-              <a:t>Every time you increase significantly your clan </a:t>
-            </a:r>
-            <a:r>
-              <a:rPr lang="en-CA" dirty="0" smtClean="0"/>
-              <a:t>membership*, </a:t>
-            </a:r>
-            <a:r>
-              <a:rPr lang="en-CA" dirty="0" smtClean="0"/>
-              <a:t>your hangout looks </a:t>
-            </a:r>
-            <a:r>
-              <a:rPr lang="en-CA" dirty="0" smtClean="0"/>
-              <a:t>nicer</a:t>
-            </a:r>
-            <a:endParaRPr lang="en-CA" dirty="0" smtClean="0"/>
+              <a:t>Every time you increase significantly your clan membership*, your hangout looks nicer</a:t>
+            </a:r>
           </a:p>
           <a:p>
             <a:pPr lvl="1"/>
@@ -10569,11 +10556,7 @@
           <a:p>
             <a:r>
               <a:rPr lang="en-CA" dirty="0" smtClean="0"/>
-              <a:t>Heroes – Unique </a:t>
-            </a:r>
-            <a:r>
-              <a:rPr lang="en-CA" dirty="0" smtClean="0"/>
-              <a:t>Ability</a:t>
+              <a:t>Heroes – Unique Ability</a:t>
             </a:r>
             <a:endParaRPr lang="en-CA" dirty="0"/>
           </a:p>
@@ -18581,37 +18564,113 @@
         </p:nvSpPr>
         <p:spPr/>
         <p:txBody>
-          <a:bodyPr/>
-          <a:lstStyle/>
-          <a:p>
-            <a:r>
-              <a:rPr lang="en-CA" dirty="0" smtClean="0"/>
-              <a:t>You can play offline either alone or in PvE against 1 or 2 bots</a:t>
-            </a:r>
-          </a:p>
-          <a:p>
-            <a:r>
-              <a:rPr lang="en-CA" dirty="0" smtClean="0"/>
-              <a:t>You do not earn trophies</a:t>
-            </a:r>
-          </a:p>
-          <a:p>
-            <a:r>
-              <a:rPr lang="en-CA" dirty="0" smtClean="0"/>
-              <a:t>You earn coin, but less than in an online match</a:t>
-            </a:r>
-          </a:p>
-          <a:p>
+          <a:bodyPr>
+            <a:normAutofit/>
+          </a:bodyPr>
+          <a:lstStyle/>
+          <a:p>
+            <a:r>
+              <a:rPr lang="en-CA" dirty="0" smtClean="0"/>
+              <a:t>You can play </a:t>
+            </a:r>
+            <a:r>
+              <a:rPr lang="en-CA" dirty="0" smtClean="0"/>
+              <a:t>in </a:t>
+            </a:r>
+            <a:r>
+              <a:rPr lang="en-CA" dirty="0" smtClean="0"/>
+              <a:t>PvE against 1 or 2 bots</a:t>
+            </a:r>
+          </a:p>
+          <a:p>
+            <a:pPr lvl="1"/>
+            <a:r>
+              <a:rPr lang="en-CA" dirty="0" smtClean="0"/>
+              <a:t>You </a:t>
+            </a:r>
+            <a:r>
+              <a:rPr lang="en-CA" dirty="0" smtClean="0"/>
+              <a:t>don’t gain </a:t>
+            </a:r>
+            <a:r>
+              <a:rPr lang="en-CA" dirty="0" smtClean="0"/>
+              <a:t>clan members or supplies</a:t>
+            </a:r>
+            <a:endParaRPr lang="en-CA" dirty="0" smtClean="0"/>
+          </a:p>
+          <a:p>
+            <a:pPr lvl="1"/>
+            <a:r>
+              <a:rPr lang="en-CA" dirty="0" smtClean="0"/>
+              <a:t>You earn </a:t>
+            </a:r>
+            <a:r>
+              <a:rPr lang="en-CA" dirty="0" smtClean="0"/>
+              <a:t>credits, </a:t>
+            </a:r>
+            <a:r>
+              <a:rPr lang="en-CA" dirty="0" smtClean="0"/>
+              <a:t>but less than in an online match</a:t>
+            </a:r>
+          </a:p>
+          <a:p>
+            <a:pPr lvl="1"/>
             <a:r>
               <a:rPr lang="en-CA" dirty="0" smtClean="0"/>
               <a:t>You earn the normal amount of XP</a:t>
             </a:r>
           </a:p>
           <a:p>
-            <a:r>
-              <a:rPr lang="en-CA" dirty="0" smtClean="0"/>
-              <a:t>You choose the mission location</a:t>
-            </a:r>
+            <a:pPr lvl="1"/>
+            <a:r>
+              <a:rPr lang="en-CA" dirty="0" smtClean="0"/>
+              <a:t>You choose the mission </a:t>
+            </a:r>
+            <a:r>
+              <a:rPr lang="en-CA" dirty="0" smtClean="0"/>
+              <a:t>location</a:t>
+            </a:r>
+          </a:p>
+          <a:p>
+            <a:r>
+              <a:rPr lang="en-CA" dirty="0" smtClean="0"/>
+              <a:t>You can play alone in the training track to practice you moves</a:t>
+            </a:r>
+          </a:p>
+          <a:p>
+            <a:pPr lvl="1"/>
+            <a:r>
+              <a:rPr lang="en-CA" dirty="0"/>
+              <a:t>You </a:t>
+            </a:r>
+            <a:r>
+              <a:rPr lang="en-CA" dirty="0" smtClean="0"/>
+              <a:t>don’t </a:t>
+            </a:r>
+            <a:r>
+              <a:rPr lang="en-CA" dirty="0"/>
+              <a:t>gain clan </a:t>
+            </a:r>
+            <a:r>
+              <a:rPr lang="en-CA" dirty="0" smtClean="0"/>
+              <a:t>members, credits or XPs</a:t>
+            </a:r>
+            <a:endParaRPr lang="en-CA" dirty="0"/>
+          </a:p>
+          <a:p>
+            <a:pPr lvl="1"/>
+            <a:r>
+              <a:rPr lang="en-CA" dirty="0" smtClean="0"/>
+              <a:t>You </a:t>
+            </a:r>
+            <a:r>
+              <a:rPr lang="en-CA" dirty="0"/>
+              <a:t>choose the mission location</a:t>
+            </a:r>
+            <a:endParaRPr lang="en-CA" dirty="0" smtClean="0"/>
+          </a:p>
+          <a:p>
+            <a:endParaRPr lang="en-CA" dirty="0" smtClean="0"/>
           </a:p>
         </p:txBody>
       </p:sp>
@@ -19300,15 +19359,7 @@
             <a:pPr lvl="1"/>
             <a:r>
               <a:rPr lang="en-CA" dirty="0" smtClean="0"/>
-              <a:t>When you have earned </a:t>
-            </a:r>
-            <a:r>
-              <a:rPr lang="en-CA" dirty="0" smtClean="0"/>
-              <a:t>100 supplies through </a:t>
-            </a:r>
-            <a:r>
-              <a:rPr lang="en-CA" dirty="0" smtClean="0"/>
-              <a:t>racing</a:t>
+              <a:t>When you have earned 100 supplies through racing</a:t>
             </a:r>
           </a:p>
           <a:p>
@@ -19427,17 +19478,8 @@
           <a:p>
             <a:r>
               <a:rPr lang="en-CA" dirty="0" smtClean="0"/>
-              <a:t>Titanium (not </a:t>
-            </a:r>
-            <a:r>
-              <a:rPr lang="en-CA" dirty="0" smtClean="0"/>
-              <a:t>all loot boxes gives </a:t>
-            </a:r>
-            <a:r>
-              <a:rPr lang="en-CA" dirty="0" smtClean="0"/>
-              <a:t>Titanium)</a:t>
-            </a:r>
-            <a:endParaRPr lang="en-CA" dirty="0" smtClean="0"/>
+              <a:t>Titanium (not all loot boxes gives Titanium)</a:t>
+            </a:r>
           </a:p>
           <a:p>
             <a:r>
@@ -19580,7 +19622,6 @@
               <a:rPr lang="en-CA" sz="2400" dirty="0" smtClean="0"/>
               <a:t>Titanium using $ (hard currency)</a:t>
             </a:r>
-            <a:endParaRPr lang="en-CA" sz="2400" dirty="0" smtClean="0"/>
           </a:p>
           <a:p>
             <a:pPr lvl="1"/>
@@ -19588,31 +19629,20 @@
               <a:rPr lang="en-CA" sz="2400" dirty="0" smtClean="0"/>
               <a:t>Credits using titanium (soft currency)</a:t>
             </a:r>
-            <a:endParaRPr lang="en-CA" sz="2400" dirty="0" smtClean="0"/>
           </a:p>
           <a:p>
             <a:pPr lvl="1"/>
             <a:r>
               <a:rPr lang="en-CA" sz="2400" dirty="0"/>
-              <a:t>Loot boxes using </a:t>
-            </a:r>
-            <a:r>
-              <a:rPr lang="en-CA" sz="2400" dirty="0"/>
-              <a:t>titanium</a:t>
-            </a:r>
-            <a:endParaRPr lang="en-CA" sz="2400" dirty="0"/>
+              <a:t>Loot boxes using titanium</a:t>
+            </a:r>
           </a:p>
           <a:p>
             <a:pPr lvl="1"/>
             <a:r>
               <a:rPr lang="en-CA" sz="2400" dirty="0" smtClean="0"/>
-              <a:t>Cards using </a:t>
-            </a:r>
-            <a:r>
-              <a:rPr lang="en-CA" sz="2400" dirty="0" smtClean="0"/>
-              <a:t>credits</a:t>
-            </a:r>
-            <a:endParaRPr lang="en-CA" sz="2400" dirty="0" smtClean="0"/>
+              <a:t>Cards using credits</a:t>
+            </a:r>
           </a:p>
         </p:txBody>
       </p:sp>

</xml_diff>

<commit_message>
New Matchmaking and small update in deck
</commit_message>
<xml_diff>
--- a/Documents/Earth Alone.pptx
+++ b/Documents/Earth Alone.pptx
@@ -258,7 +258,7 @@
           <a:p>
             <a:fld id="{478E4554-8682-0047-81B3-23DF92292DA4}" type="datetimeFigureOut">
               <a:rPr lang="fr-FR" smtClean="0"/>
-              <a:t>17-08-28</a:t>
+              <a:t>17-09-01</a:t>
             </a:fld>
             <a:endParaRPr lang="en-CA"/>
           </a:p>
@@ -424,7 +424,7 @@
           <a:p>
             <a:fld id="{4AA04B09-B6F6-1B43-9949-81D455400551}" type="datetimeFigureOut">
               <a:rPr lang="fr-FR" smtClean="0"/>
-              <a:t>17-08-28</a:t>
+              <a:t>17-09-01</a:t>
             </a:fld>
             <a:endParaRPr lang="en-CA"/>
           </a:p>
@@ -2527,7 +2527,7 @@
           <a:p>
             <a:fld id="{7839A6EA-F7B1-0B44-BC35-AD132267A4DC}" type="datetime1">
               <a:rPr lang="fr-CA" smtClean="0"/>
-              <a:t>17-08-28</a:t>
+              <a:t>17-09-01</a:t>
             </a:fld>
             <a:endParaRPr lang="en-US" dirty="0"/>
           </a:p>
@@ -2860,7 +2860,7 @@
           <a:p>
             <a:fld id="{BF3955A8-2797-EA4A-9E2A-2F8CFD12BF6E}" type="datetime1">
               <a:rPr lang="fr-CA" smtClean="0"/>
-              <a:t>17-08-28</a:t>
+              <a:t>17-09-01</a:t>
             </a:fld>
             <a:endParaRPr lang="en-CA"/>
           </a:p>
@@ -3286,7 +3286,7 @@
           <a:p>
             <a:fld id="{2623DA68-7C09-344D-94FD-BCCBFF8A9C92}" type="datetime1">
               <a:rPr lang="fr-CA" smtClean="0"/>
-              <a:t>17-08-28</a:t>
+              <a:t>17-09-01</a:t>
             </a:fld>
             <a:endParaRPr lang="en-CA"/>
           </a:p>
@@ -3707,7 +3707,7 @@
           <a:p>
             <a:fld id="{C96802C1-E6A5-A943-B158-E2ED5B1D1748}" type="datetime1">
               <a:rPr lang="fr-CA" smtClean="0"/>
-              <a:t>17-08-28</a:t>
+              <a:t>17-09-01</a:t>
             </a:fld>
             <a:endParaRPr lang="en-CA"/>
           </a:p>
@@ -3844,7 +3844,7 @@
           <a:p>
             <a:fld id="{771726DE-45DE-4B43-ACEE-C75C9862EB06}" type="datetime1">
               <a:rPr lang="fr-CA" smtClean="0"/>
-              <a:t>17-08-28</a:t>
+              <a:t>17-09-01</a:t>
             </a:fld>
             <a:endParaRPr lang="en-CA"/>
           </a:p>
@@ -4170,7 +4170,7 @@
           <a:p>
             <a:fld id="{5658D407-638E-3641-B9A7-D19475F928FE}" type="datetime1">
               <a:rPr lang="fr-CA" smtClean="0"/>
-              <a:t>17-08-28</a:t>
+              <a:t>17-09-01</a:t>
             </a:fld>
             <a:endParaRPr lang="en-CA"/>
           </a:p>
@@ -4418,7 +4418,7 @@
           <a:p>
             <a:fld id="{BB923671-466F-9240-AE09-4C886CE207AA}" type="datetime1">
               <a:rPr lang="fr-CA" smtClean="0"/>
-              <a:t>17-08-28</a:t>
+              <a:t>17-09-01</a:t>
             </a:fld>
             <a:endParaRPr lang="en-CA"/>
           </a:p>
@@ -4760,7 +4760,7 @@
           <a:p>
             <a:fld id="{677FF192-833E-5349-A041-ABA1A9340DDE}" type="datetime1">
               <a:rPr lang="fr-CA" smtClean="0"/>
-              <a:t>17-08-28</a:t>
+              <a:t>17-09-01</a:t>
             </a:fld>
             <a:endParaRPr lang="en-CA"/>
           </a:p>
@@ -5064,7 +5064,7 @@
           <a:p>
             <a:fld id="{09C4B9B5-7EFC-9244-9761-B7BDBB0AA012}" type="datetime1">
               <a:rPr lang="fr-CA" smtClean="0"/>
-              <a:t>17-08-28</a:t>
+              <a:t>17-09-01</a:t>
             </a:fld>
             <a:endParaRPr lang="en-CA"/>
           </a:p>
@@ -5475,7 +5475,7 @@
           <a:p>
             <a:fld id="{F801F428-AE77-E045-9480-3FE3AAF71E65}" type="datetime1">
               <a:rPr lang="fr-CA" smtClean="0"/>
-              <a:t>17-08-28</a:t>
+              <a:t>17-09-01</a:t>
             </a:fld>
             <a:endParaRPr lang="en-CA"/>
           </a:p>
@@ -5701,7 +5701,7 @@
           <a:p>
             <a:fld id="{ADAA07CA-59E0-A243-97BC-43C9F51FD9FF}" type="datetime1">
               <a:rPr lang="fr-CA" smtClean="0"/>
-              <a:t>17-08-28</a:t>
+              <a:t>17-09-01</a:t>
             </a:fld>
             <a:endParaRPr lang="en-CA"/>
           </a:p>
@@ -5922,7 +5922,7 @@
           <a:p>
             <a:fld id="{826A6692-799A-0F4B-A22C-2D282DEB7CD5}" type="datetime1">
               <a:rPr lang="fr-CA" smtClean="0"/>
-              <a:t>17-08-28</a:t>
+              <a:t>17-09-01</a:t>
             </a:fld>
             <a:endParaRPr lang="en-CA"/>
           </a:p>
@@ -6231,7 +6231,7 @@
           <a:p>
             <a:fld id="{DBB7E5EE-521F-EC4A-A5C3-A2A1536DAA8C}" type="datetime1">
               <a:rPr lang="fr-CA" smtClean="0"/>
-              <a:t>17-08-28</a:t>
+              <a:t>17-09-01</a:t>
             </a:fld>
             <a:endParaRPr lang="en-CA"/>
           </a:p>
@@ -6562,7 +6562,7 @@
           <a:p>
             <a:fld id="{3E6BCE1D-B433-BC48-8038-626206E41CB0}" type="datetime1">
               <a:rPr lang="fr-CA" smtClean="0"/>
-              <a:t>17-08-28</a:t>
+              <a:t>17-09-01</a:t>
             </a:fld>
             <a:endParaRPr lang="en-CA"/>
           </a:p>
@@ -6901,7 +6901,7 @@
           <a:p>
             <a:fld id="{4B73CBE7-00BA-814D-A6E3-B3D5A65032CA}" type="datetime1">
               <a:rPr lang="fr-CA" smtClean="0"/>
-              <a:t>17-08-28</a:t>
+              <a:t>17-09-01</a:t>
             </a:fld>
             <a:endParaRPr lang="en-US"/>
           </a:p>
@@ -7528,7 +7528,7 @@
           <a:p>
             <a:fld id="{1DC03657-A2BB-3242-BF25-3D72B79B6372}" type="datetime1">
               <a:rPr lang="fr-CA" smtClean="0"/>
-              <a:t>17-08-28</a:t>
+              <a:t>17-09-01</a:t>
             </a:fld>
             <a:endParaRPr lang="en-CA"/>
           </a:p>
@@ -8019,7 +8019,7 @@
           <a:p>
             <a:fld id="{A36AC3A7-7839-B545-A9B3-950A645AC025}" type="datetime1">
               <a:rPr lang="fr-CA" smtClean="0"/>
-              <a:t>17-08-28</a:t>
+              <a:t>17-09-01</a:t>
             </a:fld>
             <a:endParaRPr lang="en-CA"/>
           </a:p>
@@ -8271,7 +8271,7 @@
           <a:p>
             <a:fld id="{FB43067C-42C1-1C43-B902-066143DC70F1}" type="datetime1">
               <a:rPr lang="fr-CA" smtClean="0"/>
-              <a:t>17-08-28</a:t>
+              <a:t>17-09-01</a:t>
             </a:fld>
             <a:endParaRPr lang="en-CA"/>
           </a:p>
@@ -8571,7 +8571,7 @@
           <a:p>
             <a:fld id="{E0F2C6FF-FE77-EB42-A8D7-C92EEE9F8CA5}" type="datetime1">
               <a:rPr lang="fr-CA" smtClean="0"/>
-              <a:t>17-08-28</a:t>
+              <a:t>17-09-01</a:t>
             </a:fld>
             <a:endParaRPr lang="en-CA"/>
           </a:p>
@@ -9294,7 +9294,7 @@
         <p:spPr/>
         <p:txBody>
           <a:bodyPr>
-            <a:normAutofit fontScale="92500"/>
+            <a:normAutofit/>
           </a:bodyPr>
           <a:lstStyle/>
           <a:p>
@@ -9322,7 +9322,6 @@
               <a:rPr lang="en-CA" dirty="0" smtClean="0"/>
               <a:t>charm</a:t>
             </a:r>
-            <a:endParaRPr lang="en-CA" dirty="0" smtClean="0"/>
           </a:p>
           <a:p>
             <a:r>
@@ -9373,15 +9372,17 @@
             <a:pPr lvl="1"/>
             <a:r>
               <a:rPr lang="en-CA" dirty="0" smtClean="0"/>
-              <a:t>An arm-computer called an omni-tool</a:t>
-            </a:r>
-          </a:p>
-          <a:p>
-            <a:pPr lvl="1"/>
-            <a:r>
-              <a:rPr lang="en-CA" dirty="0" smtClean="0"/>
-              <a:t>a location on their shoulder or back where the clan emblem can be displayed</a:t>
-            </a:r>
+              <a:t>An arm-computer called an omni</a:t>
+            </a:r>
+            <a:r>
+              <a:rPr lang="en-CA" smtClean="0"/>
+              <a:t>-</a:t>
+            </a:r>
+            <a:r>
+              <a:rPr lang="en-CA" smtClean="0"/>
+              <a:t>tool</a:t>
+            </a:r>
+            <a:endParaRPr lang="en-CA" dirty="0" smtClean="0"/>
           </a:p>
         </p:txBody>
       </p:sp>
@@ -14027,11 +14028,7 @@
                     <a:p>
                       <a:r>
                         <a:rPr lang="en-CA" sz="1400" dirty="0" smtClean="0"/>
-                        <a:t>Zap </a:t>
-                      </a:r>
-                      <a:r>
-                        <a:rPr lang="en-CA" sz="1400" dirty="0" smtClean="0"/>
-                        <a:t>an opponent</a:t>
+                        <a:t>Zap an opponent</a:t>
                       </a:r>
                       <a:endParaRPr lang="en-CA" sz="1400" dirty="0"/>
                     </a:p>
@@ -14560,23 +14557,11 @@
                     <a:p>
                       <a:r>
                         <a:rPr lang="en-CA" sz="1400" dirty="0" smtClean="0"/>
-                        <a:t>Immobilise </a:t>
-                      </a:r>
-                      <a:r>
-                        <a:rPr lang="en-CA" sz="1400" dirty="0" smtClean="0"/>
-                        <a:t>an </a:t>
-                      </a:r>
-                      <a:r>
-                        <a:rPr lang="en-CA" sz="1400" dirty="0" smtClean="0"/>
-                        <a:t>opponent in a stasis</a:t>
+                        <a:t>Immobilise an opponent in a stasis</a:t>
                       </a:r>
                       <a:r>
                         <a:rPr lang="en-CA" sz="1400" baseline="0" dirty="0" smtClean="0"/>
-                        <a:t> </a:t>
-                      </a:r>
-                      <a:r>
-                        <a:rPr lang="en-CA" sz="1400" baseline="0" dirty="0" smtClean="0"/>
-                        <a:t>sphere </a:t>
+                        <a:t> sphere </a:t>
                       </a:r>
                       <a:r>
                         <a:rPr lang="en-CA" sz="1400" dirty="0" smtClean="0"/>
@@ -15127,23 +15112,7 @@
                       </a:r>
                       <a:r>
                         <a:rPr lang="en-CA" sz="1200" baseline="0" dirty="0" smtClean="0"/>
-                        <a:t> certain cards </a:t>
-                      </a:r>
-                      <a:r>
-                        <a:rPr lang="en-CA" sz="1200" baseline="0" dirty="0" smtClean="0"/>
-                        <a:t>such as lightning</a:t>
-                      </a:r>
-                      <a:r>
-                        <a:rPr lang="en-CA" sz="1200" baseline="0" dirty="0" smtClean="0"/>
-                        <a:t>, hack, </a:t>
-                      </a:r>
-                      <a:r>
-                        <a:rPr lang="en-CA" sz="1200" baseline="0" dirty="0" smtClean="0"/>
-                        <a:t>and stasis back </a:t>
-                      </a:r>
-                      <a:r>
-                        <a:rPr lang="en-CA" sz="1200" baseline="0" dirty="0" smtClean="0"/>
-                        <a:t>to the caster</a:t>
+                        <a:t> certain cards such as lightning, hack, and stasis back to the caster</a:t>
                       </a:r>
                       <a:endParaRPr lang="en-CA" sz="1200" dirty="0"/>
                     </a:p>
@@ -15353,15 +15322,7 @@
                     <a:p>
                       <a:r>
                         <a:rPr lang="en-CA" sz="1200" dirty="0" smtClean="0"/>
-                        <a:t>Steal a card from an </a:t>
-                      </a:r>
-                      <a:r>
-                        <a:rPr lang="en-CA" sz="1200" dirty="0" smtClean="0"/>
-                        <a:t>opponent’s </a:t>
-                      </a:r>
-                      <a:r>
-                        <a:rPr lang="en-CA" sz="1200" dirty="0" smtClean="0"/>
-                        <a:t>deck</a:t>
+                        <a:t>Steal a card from an opponent’s deck</a:t>
                       </a:r>
                       <a:endParaRPr lang="en-CA" sz="1200" dirty="0"/>
                     </a:p>
@@ -15466,15 +15427,7 @@
                     <a:p>
                       <a:r>
                         <a:rPr lang="en-CA" sz="1200" dirty="0" smtClean="0"/>
-                        <a:t>Create a </a:t>
-                      </a:r>
-                      <a:r>
-                        <a:rPr lang="en-CA" sz="1200" dirty="0" smtClean="0"/>
-                        <a:t>floating sentry </a:t>
-                      </a:r>
-                      <a:r>
-                        <a:rPr lang="en-CA" sz="1200" dirty="0" smtClean="0"/>
-                        <a:t>that</a:t>
+                        <a:t>Create a floating sentry that</a:t>
                       </a:r>
                       <a:r>
                         <a:rPr lang="en-CA" sz="1200" baseline="0" dirty="0" smtClean="0"/>
@@ -15591,15 +15544,7 @@
                     <a:p>
                       <a:r>
                         <a:rPr lang="en-CA" sz="1200" dirty="0" smtClean="0"/>
-                        <a:t>Create a force field to block your </a:t>
-                      </a:r>
-                      <a:r>
-                        <a:rPr lang="en-CA" sz="1200" dirty="0" smtClean="0"/>
-                        <a:t>opponents’ </a:t>
-                      </a:r>
-                      <a:r>
-                        <a:rPr lang="en-CA" sz="1200" dirty="0" smtClean="0"/>
-                        <a:t>path</a:t>
+                        <a:t>Create a force field to block your opponents’ path</a:t>
                       </a:r>
                       <a:endParaRPr lang="en-CA" sz="1200" dirty="0"/>
                     </a:p>
@@ -15704,11 +15649,7 @@
                     <a:p>
                       <a:r>
                         <a:rPr lang="en-CA" sz="1200" dirty="0" smtClean="0"/>
-                        <a:t>Fire a homing </a:t>
-                      </a:r>
-                      <a:r>
-                        <a:rPr lang="en-CA" sz="1200" dirty="0" smtClean="0"/>
-                        <a:t>missile</a:t>
+                        <a:t>Fire a homing missile</a:t>
                       </a:r>
                       <a:endParaRPr lang="en-CA" sz="1200" dirty="0"/>
                     </a:p>
@@ -15766,15 +15707,7 @@
                             <a:srgbClr val="000000"/>
                           </a:solidFill>
                         </a:rPr>
-                        <a:t>Jet </a:t>
-                      </a:r>
-                      <a:r>
-                        <a:rPr lang="en-CA" sz="1400" i="0" dirty="0" smtClean="0">
-                          <a:solidFill>
-                            <a:srgbClr val="000000"/>
-                          </a:solidFill>
-                        </a:rPr>
-                        <a:t>Pack</a:t>
+                        <a:t>Jet Pack</a:t>
                       </a:r>
                       <a:endParaRPr lang="en-CA" sz="1400" i="0" dirty="0">
                         <a:solidFill>
@@ -16360,15 +16293,7 @@
                     <a:p>
                       <a:r>
                         <a:rPr lang="en-CA" sz="1200" dirty="0" smtClean="0"/>
-                        <a:t>Hack your </a:t>
-                      </a:r>
-                      <a:r>
-                        <a:rPr lang="en-CA" sz="1200" dirty="0" smtClean="0"/>
-                        <a:t>opponents’ </a:t>
-                      </a:r>
-                      <a:r>
-                        <a:rPr lang="en-CA" sz="1200" dirty="0" smtClean="0"/>
-                        <a:t>omni-tool and prevent them from playing cards for a short while</a:t>
+                        <a:t>Hack your opponents’ omni-tool and prevent them from playing cards for a short while</a:t>
                       </a:r>
                       <a:endParaRPr lang="en-CA" sz="1200" dirty="0"/>
                     </a:p>
@@ -16473,15 +16398,7 @@
                     <a:p>
                       <a:r>
                         <a:rPr lang="en-CA" sz="1200" dirty="0" smtClean="0"/>
-                        <a:t>Push an opponent forward </a:t>
-                      </a:r>
-                      <a:r>
-                        <a:rPr lang="en-CA" sz="1200" dirty="0" smtClean="0"/>
-                        <a:t>(for </a:t>
-                      </a:r>
-                      <a:r>
-                        <a:rPr lang="en-CA" sz="1200" dirty="0" smtClean="0"/>
-                        <a:t>example into a trap)</a:t>
+                        <a:t>Push an opponent forward (for example into a trap)</a:t>
                       </a:r>
                       <a:endParaRPr lang="en-CA" sz="1200" dirty="0"/>
                     </a:p>
@@ -17607,11 +17524,7 @@
                     <a:p>
                       <a:r>
                         <a:rPr lang="en-CA" sz="1400" dirty="0" smtClean="0"/>
-                        <a:t>Cause an earth tremor that will cause damage to nearby </a:t>
-                      </a:r>
-                      <a:r>
-                        <a:rPr lang="en-CA" sz="1400" dirty="0" smtClean="0"/>
-                        <a:t>players</a:t>
+                        <a:t>Cause an earth tremor that will cause damage to nearby players</a:t>
                       </a:r>
                       <a:endParaRPr lang="en-CA" sz="1400" dirty="0"/>
                     </a:p>
@@ -17853,15 +17766,7 @@
                     <a:p>
                       <a:r>
                         <a:rPr lang="en-CA" sz="1400" baseline="0" dirty="0" smtClean="0"/>
-                        <a:t>Absorb </a:t>
-                      </a:r>
-                      <a:r>
-                        <a:rPr lang="en-CA" sz="1400" baseline="0" dirty="0" smtClean="0"/>
-                        <a:t>a certain amount of </a:t>
-                      </a:r>
-                      <a:r>
-                        <a:rPr lang="en-CA" sz="1400" baseline="0" dirty="0" smtClean="0"/>
-                        <a:t>damage before being destroyed</a:t>
+                        <a:t>Absorb a certain amount of damage before being destroyed</a:t>
                       </a:r>
                       <a:endParaRPr lang="en-CA" sz="1400" dirty="0"/>
                     </a:p>

</xml_diff>